<commit_message>
04 May 2024 update
</commit_message>
<xml_diff>
--- a/FFPM/FFPM 142.pptx
+++ b/FFPM/FFPM 142.pptx
@@ -142,6 +142,22 @@
       </a:defRPr>
     </a:lvl9pPr>
   </p:defaultTextStyle>
+  <p:extLst>
+    <p:ext uri="{EFAFB233-063F-42B5-8137-9DF3F51BA10A}">
+      <p15:sldGuideLst xmlns:p15="http://schemas.microsoft.com/office/powerpoint/2012/main">
+        <p15:guide id="1" orient="horz" pos="1620">
+          <p15:clr>
+            <a:srgbClr val="A4A3A4"/>
+          </p15:clr>
+        </p15:guide>
+        <p15:guide id="2" pos="2880">
+          <p15:clr>
+            <a:srgbClr val="A4A3A4"/>
+          </p15:clr>
+        </p15:guide>
+      </p15:sldGuideLst>
+    </p:ext>
+  </p:extLst>
 </p:presentation>
 </file>
 
@@ -336,7 +352,7 @@
               <a:pPr>
                 <a:defRPr/>
               </a:pPr>
-              <a:t>08/08/2014</a:t>
+              <a:t>19/04/2025</a:t>
             </a:fld>
             <a:endParaRPr lang="fr-FR"/>
           </a:p>
@@ -536,7 +552,7 @@
               <a:pPr>
                 <a:defRPr/>
               </a:pPr>
-              <a:t>08/08/2014</a:t>
+              <a:t>19/04/2025</a:t>
             </a:fld>
             <a:endParaRPr lang="fr-FR"/>
           </a:p>
@@ -746,7 +762,7 @@
               <a:pPr>
                 <a:defRPr/>
               </a:pPr>
-              <a:t>08/08/2014</a:t>
+              <a:t>19/04/2025</a:t>
             </a:fld>
             <a:endParaRPr lang="fr-FR"/>
           </a:p>
@@ -946,7 +962,7 @@
               <a:pPr>
                 <a:defRPr/>
               </a:pPr>
-              <a:t>08/08/2014</a:t>
+              <a:t>19/04/2025</a:t>
             </a:fld>
             <a:endParaRPr lang="fr-FR"/>
           </a:p>
@@ -1222,7 +1238,7 @@
               <a:pPr>
                 <a:defRPr/>
               </a:pPr>
-              <a:t>08/08/2014</a:t>
+              <a:t>19/04/2025</a:t>
             </a:fld>
             <a:endParaRPr lang="fr-FR"/>
           </a:p>
@@ -1540,7 +1556,7 @@
               <a:pPr>
                 <a:defRPr/>
               </a:pPr>
-              <a:t>08/08/2014</a:t>
+              <a:t>19/04/2025</a:t>
             </a:fld>
             <a:endParaRPr lang="fr-FR"/>
           </a:p>
@@ -1992,7 +2008,7 @@
               <a:pPr>
                 <a:defRPr/>
               </a:pPr>
-              <a:t>08/08/2014</a:t>
+              <a:t>19/04/2025</a:t>
             </a:fld>
             <a:endParaRPr lang="fr-FR"/>
           </a:p>
@@ -2140,7 +2156,7 @@
               <a:pPr>
                 <a:defRPr/>
               </a:pPr>
-              <a:t>08/08/2014</a:t>
+              <a:t>19/04/2025</a:t>
             </a:fld>
             <a:endParaRPr lang="fr-FR"/>
           </a:p>
@@ -2265,7 +2281,7 @@
               <a:pPr>
                 <a:defRPr/>
               </a:pPr>
-              <a:t>08/08/2014</a:t>
+              <a:t>19/04/2025</a:t>
             </a:fld>
             <a:endParaRPr lang="fr-FR"/>
           </a:p>
@@ -2572,7 +2588,7 @@
               <a:pPr>
                 <a:defRPr/>
               </a:pPr>
-              <a:t>08/08/2014</a:t>
+              <a:t>19/04/2025</a:t>
             </a:fld>
             <a:endParaRPr lang="fr-FR"/>
           </a:p>
@@ -2858,7 +2874,7 @@
               <a:pPr>
                 <a:defRPr/>
               </a:pPr>
-              <a:t>08/08/2014</a:t>
+              <a:t>19/04/2025</a:t>
             </a:fld>
             <a:endParaRPr lang="fr-FR"/>
           </a:p>
@@ -3159,7 +3175,7 @@
               <a:pPr>
                 <a:defRPr/>
               </a:pPr>
-              <a:t>08/08/2014</a:t>
+              <a:t>19/04/2025</a:t>
             </a:fld>
             <a:endParaRPr lang="fr-FR"/>
           </a:p>
@@ -3725,22 +3741,7 @@
                   </a:outerShdw>
                 </a:effectLst>
               </a:rPr>
-              <a:t>FFPM </a:t>
-            </a:r>
-            <a:r>
-              <a:rPr lang="fr-FR" sz="9600" b="1" dirty="0" smtClean="0">
-                <a:solidFill>
-                  <a:srgbClr val="FF0000"/>
-                </a:solidFill>
-                <a:effectLst>
-                  <a:outerShdw blurRad="38100" dist="38100" dir="2700000" algn="tl">
-                    <a:srgbClr val="000000">
-                      <a:alpha val="43137"/>
-                    </a:srgbClr>
-                  </a:outerShdw>
-                </a:effectLst>
-              </a:rPr>
-              <a:t>142</a:t>
+              <a:t>FFPM 142</a:t>
             </a:r>
             <a:br>
               <a:rPr lang="fr-FR" sz="9600" b="1" dirty="0" smtClean="0">
@@ -4000,20 +4001,7 @@
                 </a:effectLst>
                 <a:latin typeface="Georgia" pitchFamily="18" charset="0"/>
               </a:rPr>
-              <a:t> </a:t>
-            </a:r>
-            <a:r>
-              <a:rPr lang="en-GB" sz="6000" b="1" dirty="0" smtClean="0">
-                <a:effectLst>
-                  <a:outerShdw blurRad="38100" dist="38100" dir="2700000" algn="tl">
-                    <a:srgbClr val="000000">
-                      <a:alpha val="43137"/>
-                    </a:srgbClr>
-                  </a:outerShdw>
-                </a:effectLst>
-                <a:latin typeface="Georgia" pitchFamily="18" charset="0"/>
-              </a:rPr>
-              <a:t>!</a:t>
+              <a:t> !</a:t>
             </a:r>
             <a:r>
               <a:rPr lang="en-GB" sz="6000" b="1" dirty="0">
@@ -4141,20 +4129,7 @@
                 </a:effectLst>
                 <a:latin typeface="Georgia" pitchFamily="18" charset="0"/>
               </a:rPr>
-              <a:t> </a:t>
-            </a:r>
-            <a:r>
-              <a:rPr lang="en-GB" sz="6000" b="1" dirty="0" smtClean="0">
-                <a:effectLst>
-                  <a:outerShdw blurRad="38100" dist="38100" dir="2700000" algn="tl">
-                    <a:srgbClr val="000000">
-                      <a:alpha val="43137"/>
-                    </a:srgbClr>
-                  </a:outerShdw>
-                </a:effectLst>
-                <a:latin typeface="Georgia" pitchFamily="18" charset="0"/>
-              </a:rPr>
-              <a:t>!</a:t>
+              <a:t> !</a:t>
             </a:r>
             <a:endParaRPr lang="en-GB" sz="6000" b="1" dirty="0">
               <a:effectLst>
@@ -4913,20 +4888,7 @@
                 </a:effectLst>
                 <a:latin typeface="Georgia" pitchFamily="18" charset="0"/>
               </a:rPr>
-              <a:t> </a:t>
-            </a:r>
-            <a:r>
-              <a:rPr lang="en-GB" sz="6000" b="1" dirty="0" smtClean="0">
-                <a:effectLst>
-                  <a:outerShdw blurRad="38100" dist="38100" dir="2700000" algn="tl">
-                    <a:srgbClr val="000000">
-                      <a:alpha val="43137"/>
-                    </a:srgbClr>
-                  </a:outerShdw>
-                </a:effectLst>
-                <a:latin typeface="Georgia" pitchFamily="18" charset="0"/>
-              </a:rPr>
-              <a:t>!</a:t>
+              <a:t> !</a:t>
             </a:r>
             <a:endParaRPr lang="en-GB" sz="6000" b="1" dirty="0">
               <a:effectLst>
@@ -5659,20 +5621,7 @@
                 </a:effectLst>
                 <a:latin typeface="Georgia" pitchFamily="18" charset="0"/>
               </a:rPr>
-              <a:t> </a:t>
-            </a:r>
-            <a:r>
-              <a:rPr lang="en-GB" sz="6600" b="1" dirty="0" smtClean="0">
-                <a:effectLst>
-                  <a:outerShdw blurRad="38100" dist="38100" dir="2700000" algn="tl">
-                    <a:srgbClr val="000000">
-                      <a:alpha val="43137"/>
-                    </a:srgbClr>
-                  </a:outerShdw>
-                </a:effectLst>
-                <a:latin typeface="Georgia" pitchFamily="18" charset="0"/>
-              </a:rPr>
-              <a:t>!</a:t>
+              <a:t> !</a:t>
             </a:r>
             <a:endParaRPr lang="en-GB" sz="6600" b="1" dirty="0">
               <a:effectLst>
@@ -6405,20 +6354,7 @@
                 </a:effectLst>
                 <a:latin typeface="Georgia" pitchFamily="18" charset="0"/>
               </a:rPr>
-              <a:t> </a:t>
-            </a:r>
-            <a:r>
-              <a:rPr lang="en-GB" sz="5400" b="1" dirty="0" smtClean="0">
-                <a:effectLst>
-                  <a:outerShdw blurRad="38100" dist="38100" dir="2700000" algn="tl">
-                    <a:srgbClr val="000000">
-                      <a:alpha val="43137"/>
-                    </a:srgbClr>
-                  </a:outerShdw>
-                </a:effectLst>
-                <a:latin typeface="Georgia" pitchFamily="18" charset="0"/>
-              </a:rPr>
-              <a:t>!</a:t>
+              <a:t> !</a:t>
             </a:r>
             <a:endParaRPr lang="en-GB" sz="5400" b="1" dirty="0">
               <a:effectLst>
@@ -6517,22 +6453,35 @@
                 </a:effectLst>
                 <a:latin typeface="Georgia" pitchFamily="18" charset="0"/>
               </a:rPr>
+              <a:t> re </a:t>
+            </a:r>
+            <a:r>
+              <a:rPr lang="en-GB" sz="6000" b="1" dirty="0" err="1" smtClean="0">
+                <a:effectLst>
+                  <a:outerShdw blurRad="38100" dist="38100" dir="2700000" algn="tl">
+                    <a:srgbClr val="000000">
+                      <a:alpha val="43137"/>
+                    </a:srgbClr>
+                  </a:outerShdw>
+                </a:effectLst>
+                <a:latin typeface="Georgia" pitchFamily="18" charset="0"/>
+              </a:rPr>
+              <a:t>ny</a:t>
+            </a:r>
+            <a:r>
+              <a:rPr lang="en-GB" sz="6000" b="1" dirty="0" smtClean="0">
+                <a:effectLst>
+                  <a:outerShdw blurRad="38100" dist="38100" dir="2700000" algn="tl">
+                    <a:srgbClr val="000000">
+                      <a:alpha val="43137"/>
+                    </a:srgbClr>
+                  </a:outerShdw>
+                </a:effectLst>
+                <a:latin typeface="Georgia" pitchFamily="18" charset="0"/>
+              </a:rPr>
               <a:t> </a:t>
             </a:r>
             <a:r>
-              <a:rPr lang="en-GB" sz="6000" b="1" dirty="0" smtClean="0">
-                <a:effectLst>
-                  <a:outerShdw blurRad="38100" dist="38100" dir="2700000" algn="tl">
-                    <a:srgbClr val="000000">
-                      <a:alpha val="43137"/>
-                    </a:srgbClr>
-                  </a:outerShdw>
-                </a:effectLst>
-                <a:latin typeface="Georgia" pitchFamily="18" charset="0"/>
-              </a:rPr>
-              <a:t>re </a:t>
-            </a:r>
-            <a:r>
               <a:rPr lang="en-GB" sz="6000" b="1" dirty="0" err="1" smtClean="0">
                 <a:effectLst>
                   <a:outerShdw blurRad="38100" dist="38100" dir="2700000" algn="tl">
@@ -6543,7 +6492,7 @@
                 </a:effectLst>
                 <a:latin typeface="Georgia" pitchFamily="18" charset="0"/>
               </a:rPr>
-              <a:t>nysaotranay</a:t>
+              <a:t>saotranay</a:t>
             </a:r>
             <a:r>
               <a:rPr lang="en-GB" sz="6000" b="1" dirty="0" smtClean="0">

</xml_diff>